<commit_message>
Fix security config, data.sql and passwordEncoder
</commit_message>
<xml_diff>
--- a/Spring_Security.pptx
+++ b/Spring_Security.pptx
@@ -343,7 +343,7 @@
           <a:p>
             <a:fld id="{A2040813-E246-4EEE-B198-3EDEA39B1BE1}" type="datetimeFigureOut">
               <a:rPr lang="de-DE" smtClean="0"/>
-              <a:t>07.07.2025</a:t>
+              <a:t>08.07.2025</a:t>
             </a:fld>
             <a:endParaRPr lang="de-DE"/>
           </a:p>
@@ -4721,7 +4721,7 @@
             <a:fld id="{B61BEF0D-F0BB-DE4B-95CE-6DB70DBA9567}" type="datetimeFigureOut">
               <a:rPr lang="en-US" dirty="0"/>
               <a:pPr/>
-              <a:t>7/7/2025</a:t>
+              <a:t>7/8/2025</a:t>
             </a:fld>
             <a:endParaRPr lang="en-US" dirty="0"/>
           </a:p>
@@ -4969,7 +4969,7 @@
             <a:fld id="{B61BEF0D-F0BB-DE4B-95CE-6DB70DBA9567}" type="datetimeFigureOut">
               <a:rPr lang="en-US" dirty="0"/>
               <a:pPr/>
-              <a:t>7/7/2025</a:t>
+              <a:t>7/8/2025</a:t>
             </a:fld>
             <a:endParaRPr lang="en-US" dirty="0"/>
           </a:p>
@@ -5280,7 +5280,7 @@
             <a:fld id="{B61BEF0D-F0BB-DE4B-95CE-6DB70DBA9567}" type="datetimeFigureOut">
               <a:rPr lang="en-US" dirty="0"/>
               <a:pPr/>
-              <a:t>7/7/2025</a:t>
+              <a:t>7/8/2025</a:t>
             </a:fld>
             <a:endParaRPr lang="en-US" dirty="0"/>
           </a:p>
@@ -5618,7 +5618,7 @@
             <a:fld id="{B61BEF0D-F0BB-DE4B-95CE-6DB70DBA9567}" type="datetimeFigureOut">
               <a:rPr lang="en-US" dirty="0"/>
               <a:pPr/>
-              <a:t>7/7/2025</a:t>
+              <a:t>7/8/2025</a:t>
             </a:fld>
             <a:endParaRPr lang="en-US" dirty="0"/>
           </a:p>
@@ -5929,7 +5929,7 @@
             <a:fld id="{B61BEF0D-F0BB-DE4B-95CE-6DB70DBA9567}" type="datetimeFigureOut">
               <a:rPr lang="en-US" dirty="0"/>
               <a:pPr/>
-              <a:t>7/7/2025</a:t>
+              <a:t>7/8/2025</a:t>
             </a:fld>
             <a:endParaRPr lang="en-US" dirty="0"/>
           </a:p>
@@ -6319,7 +6319,7 @@
             <a:fld id="{B61BEF0D-F0BB-DE4B-95CE-6DB70DBA9567}" type="datetimeFigureOut">
               <a:rPr lang="en-US" dirty="0"/>
               <a:pPr/>
-              <a:t>7/7/2025</a:t>
+              <a:t>7/8/2025</a:t>
             </a:fld>
             <a:endParaRPr lang="en-US" dirty="0"/>
           </a:p>
@@ -6485,7 +6485,7 @@
           <a:p>
             <a:fld id="{55C6B4A9-1611-4792-9094-5F34BCA07E0B}" type="datetimeFigureOut">
               <a:rPr lang="en-US" dirty="0"/>
-              <a:t>7/7/2025</a:t>
+              <a:t>7/8/2025</a:t>
             </a:fld>
             <a:endParaRPr lang="en-US" dirty="0"/>
           </a:p>
@@ -6661,7 +6661,7 @@
             <a:fld id="{B61BEF0D-F0BB-DE4B-95CE-6DB70DBA9567}" type="datetimeFigureOut">
               <a:rPr lang="en-US" dirty="0"/>
               <a:pPr/>
-              <a:t>7/7/2025</a:t>
+              <a:t>7/8/2025</a:t>
             </a:fld>
             <a:endParaRPr lang="en-US" dirty="0"/>
           </a:p>
@@ -6834,7 +6834,7 @@
             <a:fld id="{B61BEF0D-F0BB-DE4B-95CE-6DB70DBA9567}" type="datetimeFigureOut">
               <a:rPr lang="en-US" dirty="0"/>
               <a:pPr/>
-              <a:t>7/7/2025</a:t>
+              <a:t>7/8/2025</a:t>
             </a:fld>
             <a:endParaRPr lang="en-US" dirty="0"/>
           </a:p>
@@ -7078,7 +7078,7 @@
             <a:fld id="{B61BEF0D-F0BB-DE4B-95CE-6DB70DBA9567}" type="datetimeFigureOut">
               <a:rPr lang="en-US" dirty="0"/>
               <a:pPr/>
-              <a:t>7/7/2025</a:t>
+              <a:t>7/8/2025</a:t>
             </a:fld>
             <a:endParaRPr lang="en-US" dirty="0"/>
           </a:p>
@@ -7306,7 +7306,7 @@
           <a:p>
             <a:fld id="{EB712588-04B1-427B-82EE-E8DB90309F08}" type="datetimeFigureOut">
               <a:rPr lang="en-US" dirty="0"/>
-              <a:t>7/7/2025</a:t>
+              <a:t>7/8/2025</a:t>
             </a:fld>
             <a:endParaRPr lang="en-US" dirty="0"/>
           </a:p>
@@ -7676,7 +7676,7 @@
             <a:fld id="{B61BEF0D-F0BB-DE4B-95CE-6DB70DBA9567}" type="datetimeFigureOut">
               <a:rPr lang="en-US" dirty="0"/>
               <a:pPr/>
-              <a:t>7/7/2025</a:t>
+              <a:t>7/8/2025</a:t>
             </a:fld>
             <a:endParaRPr lang="en-US" dirty="0"/>
           </a:p>
@@ -7796,7 +7796,7 @@
             <a:fld id="{B61BEF0D-F0BB-DE4B-95CE-6DB70DBA9567}" type="datetimeFigureOut">
               <a:rPr lang="en-US" dirty="0"/>
               <a:pPr/>
-              <a:t>7/7/2025</a:t>
+              <a:t>7/8/2025</a:t>
             </a:fld>
             <a:endParaRPr lang="en-US" dirty="0"/>
           </a:p>
@@ -7888,7 +7888,7 @@
             <a:fld id="{B61BEF0D-F0BB-DE4B-95CE-6DB70DBA9567}" type="datetimeFigureOut">
               <a:rPr lang="en-US" dirty="0"/>
               <a:pPr/>
-              <a:t>7/7/2025</a:t>
+              <a:t>7/8/2025</a:t>
             </a:fld>
             <a:endParaRPr lang="en-US" dirty="0"/>
           </a:p>
@@ -8139,7 +8139,7 @@
           <a:p>
             <a:fld id="{42A54C80-263E-416B-A8E0-580EDEADCBDC}" type="datetimeFigureOut">
               <a:rPr lang="en-US" dirty="0"/>
-              <a:t>7/7/2025</a:t>
+              <a:t>7/8/2025</a:t>
             </a:fld>
             <a:endParaRPr lang="en-US" dirty="0"/>
           </a:p>
@@ -8398,7 +8398,7 @@
             <a:fld id="{B61BEF0D-F0BB-DE4B-95CE-6DB70DBA9567}" type="datetimeFigureOut">
               <a:rPr lang="en-US" dirty="0"/>
               <a:pPr/>
-              <a:t>7/7/2025</a:t>
+              <a:t>7/8/2025</a:t>
             </a:fld>
             <a:endParaRPr lang="en-US" dirty="0"/>
           </a:p>
@@ -9204,7 +9204,7 @@
             <a:fld id="{B61BEF0D-F0BB-DE4B-95CE-6DB70DBA9567}" type="datetimeFigureOut">
               <a:rPr lang="en-US" dirty="0"/>
               <a:pPr/>
-              <a:t>7/7/2025</a:t>
+              <a:t>7/8/2025</a:t>
             </a:fld>
             <a:endParaRPr lang="en-US" dirty="0"/>
           </a:p>
@@ -21916,12 +21916,14 @@
           </a:p>
           <a:p>
             <a:r>
-              <a:rPr lang="de-DE" sz="2000" dirty="0" err="1"/>
-              <a:t>AutorisierungCSRF</a:t>
-            </a:r>
-            <a:r>
               <a:rPr lang="de-DE" sz="2000" dirty="0"/>
-              <a:t> &amp; CORS</a:t>
+              <a:t>Autorisierung</a:t>
+            </a:r>
+          </a:p>
+          <a:p>
+            <a:r>
+              <a:rPr lang="de-DE" sz="2000" dirty="0"/>
+              <a:t>CSRF &amp; CORS</a:t>
             </a:r>
           </a:p>
           <a:p>
@@ -21964,18 +21966,14 @@
               <a:t>Authorization</a:t>
             </a:r>
             <a:r>
-              <a:rPr lang="de-DE" sz="2000"/>
+              <a:rPr lang="de-DE" sz="2000" dirty="0"/>
               <a:t> Server</a:t>
             </a:r>
           </a:p>
           <a:p>
             <a:r>
-              <a:rPr lang="de-DE" sz="2000"/>
-              <a:t>Spring </a:t>
-            </a:r>
-            <a:r>
               <a:rPr lang="de-DE" sz="2000" dirty="0"/>
-              <a:t>Security Best Practices</a:t>
+              <a:t>Spring Security Best Practices</a:t>
             </a:r>
           </a:p>
         </p:txBody>
@@ -27211,7 +27209,7 @@
           <a:p>
             <a:r>
               <a:rPr lang="de-DE" dirty="0"/>
-              <a:t>Natürlich mit einem</a:t>
+              <a:t>Natürlich mit einem Test</a:t>
             </a:r>
           </a:p>
         </p:txBody>

</xml_diff>